<commit_message>
updated lectures and code
</commit_message>
<xml_diff>
--- a/lectures/week_1_intro_to_R/ex1_intro_to_R.pptx
+++ b/lectures/week_1_intro_to_R/ex1_intro_to_R.pptx
@@ -204,7 +204,7 @@
           <a:p>
             <a:fld id="{E3F55388-6A8F-1341-9D1E-B023B27BE3D5}" type="datetimeFigureOut">
               <a:rPr lang="en-US" smtClean="0"/>
-              <a:t>1/21/21</a:t>
+              <a:t>1/14/22</a:t>
             </a:fld>
             <a:endParaRPr lang="en-US"/>
           </a:p>
@@ -702,7 +702,7 @@
           <a:p>
             <a:fld id="{FA0BDF2A-8048-BB44-864C-819C200F781C}" type="datetimeFigureOut">
               <a:rPr lang="en-US" smtClean="0"/>
-              <a:t>1/21/21</a:t>
+              <a:t>1/14/22</a:t>
             </a:fld>
             <a:endParaRPr lang="en-US"/>
           </a:p>
@@ -900,7 +900,7 @@
           <a:p>
             <a:fld id="{FA0BDF2A-8048-BB44-864C-819C200F781C}" type="datetimeFigureOut">
               <a:rPr lang="en-US" smtClean="0"/>
-              <a:t>1/21/21</a:t>
+              <a:t>1/14/22</a:t>
             </a:fld>
             <a:endParaRPr lang="en-US"/>
           </a:p>
@@ -1108,7 +1108,7 @@
           <a:p>
             <a:fld id="{FA0BDF2A-8048-BB44-864C-819C200F781C}" type="datetimeFigureOut">
               <a:rPr lang="en-US" smtClean="0"/>
-              <a:t>1/21/21</a:t>
+              <a:t>1/14/22</a:t>
             </a:fld>
             <a:endParaRPr lang="en-US"/>
           </a:p>
@@ -1306,7 +1306,7 @@
           <a:p>
             <a:fld id="{FA0BDF2A-8048-BB44-864C-819C200F781C}" type="datetimeFigureOut">
               <a:rPr lang="en-US" smtClean="0"/>
-              <a:t>1/21/21</a:t>
+              <a:t>1/14/22</a:t>
             </a:fld>
             <a:endParaRPr lang="en-US"/>
           </a:p>
@@ -1581,7 +1581,7 @@
           <a:p>
             <a:fld id="{FA0BDF2A-8048-BB44-864C-819C200F781C}" type="datetimeFigureOut">
               <a:rPr lang="en-US" smtClean="0"/>
-              <a:t>1/21/21</a:t>
+              <a:t>1/14/22</a:t>
             </a:fld>
             <a:endParaRPr lang="en-US"/>
           </a:p>
@@ -1846,7 +1846,7 @@
           <a:p>
             <a:fld id="{FA0BDF2A-8048-BB44-864C-819C200F781C}" type="datetimeFigureOut">
               <a:rPr lang="en-US" smtClean="0"/>
-              <a:t>1/21/21</a:t>
+              <a:t>1/14/22</a:t>
             </a:fld>
             <a:endParaRPr lang="en-US"/>
           </a:p>
@@ -2258,7 +2258,7 @@
           <a:p>
             <a:fld id="{FA0BDF2A-8048-BB44-864C-819C200F781C}" type="datetimeFigureOut">
               <a:rPr lang="en-US" smtClean="0"/>
-              <a:t>1/21/21</a:t>
+              <a:t>1/14/22</a:t>
             </a:fld>
             <a:endParaRPr lang="en-US"/>
           </a:p>
@@ -2399,7 +2399,7 @@
           <a:p>
             <a:fld id="{FA0BDF2A-8048-BB44-864C-819C200F781C}" type="datetimeFigureOut">
               <a:rPr lang="en-US" smtClean="0"/>
-              <a:t>1/21/21</a:t>
+              <a:t>1/14/22</a:t>
             </a:fld>
             <a:endParaRPr lang="en-US"/>
           </a:p>
@@ -2512,7 +2512,7 @@
           <a:p>
             <a:fld id="{FA0BDF2A-8048-BB44-864C-819C200F781C}" type="datetimeFigureOut">
               <a:rPr lang="en-US" smtClean="0"/>
-              <a:t>1/21/21</a:t>
+              <a:t>1/14/22</a:t>
             </a:fld>
             <a:endParaRPr lang="en-US"/>
           </a:p>
@@ -2823,7 +2823,7 @@
           <a:p>
             <a:fld id="{FA0BDF2A-8048-BB44-864C-819C200F781C}" type="datetimeFigureOut">
               <a:rPr lang="en-US" smtClean="0"/>
-              <a:t>1/21/21</a:t>
+              <a:t>1/14/22</a:t>
             </a:fld>
             <a:endParaRPr lang="en-US"/>
           </a:p>
@@ -3111,7 +3111,7 @@
           <a:p>
             <a:fld id="{FA0BDF2A-8048-BB44-864C-819C200F781C}" type="datetimeFigureOut">
               <a:rPr lang="en-US" smtClean="0"/>
-              <a:t>1/21/21</a:t>
+              <a:t>1/14/22</a:t>
             </a:fld>
             <a:endParaRPr lang="en-US"/>
           </a:p>
@@ -3352,7 +3352,7 @@
           <a:p>
             <a:fld id="{FA0BDF2A-8048-BB44-864C-819C200F781C}" type="datetimeFigureOut">
               <a:rPr lang="en-US" smtClean="0"/>
-              <a:t>1/21/21</a:t>
+              <a:t>1/14/22</a:t>
             </a:fld>
             <a:endParaRPr lang="en-US"/>
           </a:p>
@@ -4982,7 +4982,7 @@
             </a:r>
             <a:r>
               <a:rPr lang="en-US" i="1" dirty="0"/>
-              <a:t> n() function and spread() or gather() paired with piping to make the same table I do with base R.</a:t>
+              <a:t> functions paired with piping to make the same table I do with base R.</a:t>
             </a:r>
             <a:endParaRPr lang="en-US" dirty="0"/>
           </a:p>

</xml_diff>